<commit_message>
added screenshot of koala presence locations
</commit_message>
<xml_diff>
--- a/ICC_koala_sdm_slides.pptx
+++ b/ICC_koala_sdm_slides.pptx
@@ -16,9 +16,10 @@
     <p:sldId id="261" r:id="rId10"/>
     <p:sldId id="262" r:id="rId11"/>
     <p:sldId id="269" r:id="rId12"/>
-    <p:sldId id="267" r:id="rId13"/>
-    <p:sldId id="257" r:id="rId14"/>
-    <p:sldId id="258" r:id="rId15"/>
+    <p:sldId id="270" r:id="rId13"/>
+    <p:sldId id="267" r:id="rId14"/>
+    <p:sldId id="257" r:id="rId15"/>
+    <p:sldId id="258" r:id="rId16"/>
   </p:sldIdLst>
   <p:sldSz cx="12192000" cy="6858000"/>
   <p:notesSz cx="6858000" cy="9144000"/>
@@ -128,6 +129,7 @@
 <file path=ppt/revisionInfo.xml><?xml version="1.0" encoding="utf-8"?>
 <p1510:revInfo xmlns:a="http://schemas.openxmlformats.org/drawingml/2006/main" xmlns:r="http://schemas.openxmlformats.org/officeDocument/2006/relationships" xmlns:p1510="http://schemas.microsoft.com/office/powerpoint/2015/10/main">
   <p1510:revLst>
+    <p1510:client id="{0F2B6B5F-794E-4944-82ED-9E38D30EF2F5}" v="3" dt="2025-04-03T05:20:39.973"/>
     <p1510:client id="{D31FD800-5519-4CBD-B48F-1780726ABED0}" v="11" dt="2025-04-03T01:27:58.168"/>
   </p1510:revLst>
 </p1510:revInfo>
@@ -135,6 +137,45 @@
 
 <file path=ppt/changesInfos/changesInfo1.xml><?xml version="1.0" encoding="utf-8"?>
 <pc:chgInfo xmlns:a="http://schemas.openxmlformats.org/drawingml/2006/main" xmlns:r="http://schemas.openxmlformats.org/officeDocument/2006/relationships" xmlns:ac="http://schemas.microsoft.com/office/drawing/2013/main/command" xmlns:pc="http://schemas.microsoft.com/office/powerpoint/2013/main/command">
+  <pc:docChgLst>
+    <pc:chgData name="Scott Forrest" userId="95fbf796-a2c8-4799-ab79-0e94d63402e7" providerId="ADAL" clId="{0F2B6B5F-794E-4944-82ED-9E38D30EF2F5}"/>
+    <pc:docChg chg="addSld modSld">
+      <pc:chgData name="Scott Forrest" userId="95fbf796-a2c8-4799-ab79-0e94d63402e7" providerId="ADAL" clId="{0F2B6B5F-794E-4944-82ED-9E38D30EF2F5}" dt="2025-04-03T05:20:39.973" v="2"/>
+      <pc:docMkLst>
+        <pc:docMk/>
+      </pc:docMkLst>
+      <pc:sldChg chg="addSp modSp">
+        <pc:chgData name="Scott Forrest" userId="95fbf796-a2c8-4799-ab79-0e94d63402e7" providerId="ADAL" clId="{0F2B6B5F-794E-4944-82ED-9E38D30EF2F5}" dt="2025-04-03T05:20:33.009" v="0"/>
+        <pc:sldMkLst>
+          <pc:docMk/>
+          <pc:sldMk cId="1685990104" sldId="269"/>
+        </pc:sldMkLst>
+        <pc:picChg chg="add mod">
+          <ac:chgData name="Scott Forrest" userId="95fbf796-a2c8-4799-ab79-0e94d63402e7" providerId="ADAL" clId="{0F2B6B5F-794E-4944-82ED-9E38D30EF2F5}" dt="2025-04-03T05:20:33.009" v="0"/>
+          <ac:picMkLst>
+            <pc:docMk/>
+            <pc:sldMk cId="1685990104" sldId="269"/>
+            <ac:picMk id="4" creationId="{B6195514-A1A0-A2C0-45EA-304C9EE583A6}"/>
+          </ac:picMkLst>
+        </pc:picChg>
+      </pc:sldChg>
+      <pc:sldChg chg="addSp modSp new">
+        <pc:chgData name="Scott Forrest" userId="95fbf796-a2c8-4799-ab79-0e94d63402e7" providerId="ADAL" clId="{0F2B6B5F-794E-4944-82ED-9E38D30EF2F5}" dt="2025-04-03T05:20:39.973" v="2"/>
+        <pc:sldMkLst>
+          <pc:docMk/>
+          <pc:sldMk cId="1564928012" sldId="270"/>
+        </pc:sldMkLst>
+        <pc:picChg chg="add mod">
+          <ac:chgData name="Scott Forrest" userId="95fbf796-a2c8-4799-ab79-0e94d63402e7" providerId="ADAL" clId="{0F2B6B5F-794E-4944-82ED-9E38D30EF2F5}" dt="2025-04-03T05:20:39.973" v="2"/>
+          <ac:picMkLst>
+            <pc:docMk/>
+            <pc:sldMk cId="1564928012" sldId="270"/>
+            <ac:picMk id="4" creationId="{F5C8BEF9-0B31-8D59-5057-32E7DF814BCF}"/>
+          </ac:picMkLst>
+        </pc:picChg>
+      </pc:sldChg>
+    </pc:docChg>
+  </pc:docChgLst>
   <pc:docChgLst>
     <pc:chgData name="Charlotte Ruby Patterson" userId="5e4f2a4d-4d7e-4526-8ff8-c9f44bf0b6b7" providerId="ADAL" clId="{D31FD800-5519-4CBD-B48F-1780726ABED0}"/>
     <pc:docChg chg="undo custSel addSld delSld modSld sldOrd">
@@ -4112,6 +4153,116 @@
           <p:cNvPr id="2" name="Title 1">
             <a:extLst>
               <a:ext uri="{FF2B5EF4-FFF2-40B4-BE49-F238E27FC236}">
+                <a16:creationId xmlns:a16="http://schemas.microsoft.com/office/drawing/2014/main" id="{16EF3F8D-F173-E33A-D24E-F3E44371E8AF}"/>
+              </a:ext>
+            </a:extLst>
+          </p:cNvPr>
+          <p:cNvSpPr>
+            <a:spLocks noGrp="1"/>
+          </p:cNvSpPr>
+          <p:nvPr>
+            <p:ph type="title"/>
+          </p:nvPr>
+        </p:nvSpPr>
+        <p:spPr/>
+        <p:txBody>
+          <a:bodyPr/>
+          <a:lstStyle/>
+          <a:p>
+            <a:endParaRPr lang="en-AU"/>
+          </a:p>
+        </p:txBody>
+      </p:sp>
+      <p:sp>
+        <p:nvSpPr>
+          <p:cNvPr id="3" name="Content Placeholder 2">
+            <a:extLst>
+              <a:ext uri="{FF2B5EF4-FFF2-40B4-BE49-F238E27FC236}">
+                <a16:creationId xmlns:a16="http://schemas.microsoft.com/office/drawing/2014/main" id="{EF7DFC0B-EE5D-A57B-5AC7-7A89F2BFDACC}"/>
+              </a:ext>
+            </a:extLst>
+          </p:cNvPr>
+          <p:cNvSpPr>
+            <a:spLocks noGrp="1"/>
+          </p:cNvSpPr>
+          <p:nvPr>
+            <p:ph idx="1"/>
+          </p:nvPr>
+        </p:nvSpPr>
+        <p:spPr/>
+        <p:txBody>
+          <a:bodyPr/>
+          <a:lstStyle/>
+          <a:p>
+            <a:endParaRPr lang="en-AU"/>
+          </a:p>
+        </p:txBody>
+      </p:sp>
+      <p:pic>
+        <p:nvPicPr>
+          <p:cNvPr id="4" name="Picture 3">
+            <a:extLst>
+              <a:ext uri="{FF2B5EF4-FFF2-40B4-BE49-F238E27FC236}">
+                <a16:creationId xmlns:a16="http://schemas.microsoft.com/office/drawing/2014/main" id="{F5C8BEF9-0B31-8D59-5057-32E7DF814BCF}"/>
+              </a:ext>
+            </a:extLst>
+          </p:cNvPr>
+          <p:cNvPicPr>
+            <a:picLocks noChangeAspect="1"/>
+          </p:cNvPicPr>
+          <p:nvPr/>
+        </p:nvPicPr>
+        <p:blipFill>
+          <a:blip r:embed="rId2"/>
+          <a:stretch>
+            <a:fillRect/>
+          </a:stretch>
+        </p:blipFill>
+        <p:spPr>
+          <a:xfrm>
+            <a:off x="0" y="0"/>
+            <a:ext cx="12192000" cy="6858000"/>
+          </a:xfrm>
+          <a:prstGeom prst="rect">
+            <a:avLst/>
+          </a:prstGeom>
+        </p:spPr>
+      </p:pic>
+    </p:spTree>
+    <p:extLst>
+      <p:ext uri="{BB962C8B-B14F-4D97-AF65-F5344CB8AC3E}">
+        <p14:creationId xmlns:p14="http://schemas.microsoft.com/office/powerpoint/2010/main" val="1564928012"/>
+      </p:ext>
+    </p:extLst>
+  </p:cSld>
+  <p:clrMapOvr>
+    <a:masterClrMapping/>
+  </p:clrMapOvr>
+</p:sld>
+</file>
+
+<file path=ppt/slides/slide13.xml><?xml version="1.0" encoding="utf-8"?>
+<p:sld xmlns:a="http://schemas.openxmlformats.org/drawingml/2006/main" xmlns:r="http://schemas.openxmlformats.org/officeDocument/2006/relationships" xmlns:p="http://schemas.openxmlformats.org/presentationml/2006/main">
+  <p:cSld>
+    <p:spTree>
+      <p:nvGrpSpPr>
+        <p:cNvPr id="1" name=""/>
+        <p:cNvGrpSpPr/>
+        <p:nvPr/>
+      </p:nvGrpSpPr>
+      <p:grpSpPr>
+        <a:xfrm>
+          <a:off x="0" y="0"/>
+          <a:ext cx="0" cy="0"/>
+          <a:chOff x="0" y="0"/>
+          <a:chExt cx="0" cy="0"/>
+        </a:xfrm>
+      </p:grpSpPr>
+      <p:sp>
+        <p:nvSpPr>
+          <p:cNvPr id="2" name="Title 1">
+            <a:extLst>
+              <a:ext uri="{FF2B5EF4-FFF2-40B4-BE49-F238E27FC236}">
                 <a16:creationId xmlns:a16="http://schemas.microsoft.com/office/drawing/2014/main" id="{E2BD4AA1-B2AE-398B-9DD9-3F923093C2B9}"/>
               </a:ext>
             </a:extLst>
@@ -4177,7 +4328,7 @@
 </p:sld>
 </file>
 
-<file path=ppt/slides/slide13.xml><?xml version="1.0" encoding="utf-8"?>
+<file path=ppt/slides/slide14.xml><?xml version="1.0" encoding="utf-8"?>
 <p:sld xmlns:a="http://schemas.openxmlformats.org/drawingml/2006/main" xmlns:r="http://schemas.openxmlformats.org/officeDocument/2006/relationships" xmlns:p="http://schemas.openxmlformats.org/presentationml/2006/main">
   <p:cSld>
     <p:spTree>
@@ -4267,7 +4418,7 @@
 </p:sld>
 </file>
 
-<file path=ppt/slides/slide14.xml><?xml version="1.0" encoding="utf-8"?>
+<file path=ppt/slides/slide15.xml><?xml version="1.0" encoding="utf-8"?>
 <p:sld xmlns:a="http://schemas.openxmlformats.org/drawingml/2006/main" xmlns:r="http://schemas.openxmlformats.org/officeDocument/2006/relationships" xmlns:p="http://schemas.openxmlformats.org/presentationml/2006/main">
   <p:cSld>
     <p:spTree>

</xml_diff>